<commit_message>
updated phylobayes to indicate gammaomega
</commit_message>
<xml_diff>
--- a/manuscript/figures/figures.pptx
+++ b/manuscript/figures/figures.pptx
@@ -7128,79 +7128,157 @@
               </a:p>
             </p:txBody>
           </p:sp>
-          <p:sp>
-            <p:nvSpPr>
-              <p:cNvPr id="22" name="TextBox 21"/>
-              <p:cNvSpPr txBox="1"/>
-              <p:nvPr/>
-            </p:nvSpPr>
-            <p:spPr>
-              <a:xfrm rot="16200000" flipH="1">
-                <a:off x="-119094" y="2748597"/>
-                <a:ext cx="4907286" cy="1015663"/>
-              </a:xfrm>
-              <a:prstGeom prst="rect">
-                <a:avLst/>
-              </a:prstGeom>
-              <a:solidFill>
-                <a:schemeClr val="bg1"/>
-              </a:solidFill>
-            </p:spPr>
-            <p:txBody>
-              <a:bodyPr wrap="square" rtlCol="0">
-                <a:spAutoFit/>
-              </a:bodyPr>
-              <a:lstStyle/>
-              <a:p>
-                <a:pPr algn="ctr"/>
-                <a:r>
-                  <a:rPr lang="en-US" sz="3000" b="1" dirty="0" err="1" smtClean="0">
-                    <a:latin typeface="Yu Gothic" charset="-128"/>
-                    <a:ea typeface="Yu Gothic" charset="-128"/>
-                    <a:cs typeface="Yu Gothic" charset="-128"/>
-                  </a:rPr>
-                  <a:t>ExpCM</a:t>
-                </a:r>
-                <a:r>
-                  <a:rPr lang="en-US" sz="3000" b="1" dirty="0" smtClean="0">
-                    <a:latin typeface="Yu Gothic" charset="-128"/>
-                    <a:ea typeface="Yu Gothic" charset="-128"/>
-                    <a:cs typeface="Yu Gothic" charset="-128"/>
-                  </a:rPr>
-                  <a:t> (H1+H3 </a:t>
-                </a:r>
-                <a:r>
-                  <a:rPr lang="en-US" sz="3000" b="1" dirty="0" err="1" smtClean="0">
-                    <a:latin typeface="Yu Gothic" charset="-128"/>
-                    <a:ea typeface="Yu Gothic" charset="-128"/>
-                    <a:cs typeface="Yu Gothic" charset="-128"/>
-                  </a:rPr>
-                  <a:t>avg</a:t>
-                </a:r>
-                <a:r>
-                  <a:rPr lang="en-US" sz="3000" b="1" dirty="0" smtClean="0">
-                    <a:latin typeface="Yu Gothic" charset="-128"/>
-                    <a:ea typeface="Yu Gothic" charset="-128"/>
-                    <a:cs typeface="Yu Gothic" charset="-128"/>
-                  </a:rPr>
-                  <a:t>) </a:t>
-                </a:r>
-                <a:r>
-                  <a:rPr lang="en-US" sz="3000" dirty="0" smtClean="0">
-                    <a:latin typeface="Yu Gothic" charset="-128"/>
-                    <a:ea typeface="Yu Gothic" charset="-128"/>
-                    <a:cs typeface="Yu Gothic" charset="-128"/>
-                  </a:rPr>
-                  <a:t>normalized branch length</a:t>
-                </a:r>
-                <a:endParaRPr lang="en-US" sz="3000" dirty="0">
-                  <a:latin typeface="Yu Gothic" charset="-128"/>
-                  <a:ea typeface="Yu Gothic" charset="-128"/>
-                  <a:cs typeface="Yu Gothic" charset="-128"/>
-                </a:endParaRPr>
-              </a:p>
-            </p:txBody>
-          </p:sp>
+          <mc:AlternateContent xmlns:mc="http://schemas.openxmlformats.org/markup-compatibility/2006">
+            <mc:Choice xmlns:a14="http://schemas.microsoft.com/office/drawing/2010/main" Requires="a14">
+              <p:sp>
+                <p:nvSpPr>
+                  <p:cNvPr id="22" name="TextBox 21"/>
+                  <p:cNvSpPr txBox="1"/>
+                  <p:nvPr/>
+                </p:nvSpPr>
+                <p:spPr>
+                  <a:xfrm rot="16200000" flipH="1">
+                    <a:off x="-119094" y="2748597"/>
+                    <a:ext cx="4907286" cy="1015663"/>
+                  </a:xfrm>
+                  <a:prstGeom prst="rect">
+                    <a:avLst/>
+                  </a:prstGeom>
+                  <a:solidFill>
+                    <a:schemeClr val="bg1"/>
+                  </a:solidFill>
+                </p:spPr>
+                <p:txBody>
+                  <a:bodyPr wrap="square" rtlCol="0">
+                    <a:spAutoFit/>
+                  </a:bodyPr>
+                  <a:lstStyle/>
+                  <a:p>
+                    <a:pPr algn="ctr"/>
+                    <a:r>
+                      <a:rPr lang="en-US" sz="3000" b="1" dirty="0" err="1" smtClean="0">
+                        <a:latin typeface="Yu Gothic" charset="-128"/>
+                        <a:ea typeface="Yu Gothic" charset="-128"/>
+                        <a:cs typeface="Yu Gothic" charset="-128"/>
+                      </a:rPr>
+                      <a:t>ExpCM</a:t>
+                    </a:r>
+                    <a:r>
+                      <a:rPr lang="en-US" sz="3000" b="1" dirty="0" smtClean="0">
+                        <a:latin typeface="Yu Gothic" charset="-128"/>
+                        <a:ea typeface="Yu Gothic" charset="-128"/>
+                        <a:cs typeface="Yu Gothic" charset="-128"/>
+                      </a:rPr>
+                      <a:t>+</a:t>
+                    </a:r>
+                    <a14:m>
+                      <m:oMath xmlns:m="http://schemas.openxmlformats.org/officeDocument/2006/math">
+                        <m:r>
+                          <a:rPr lang="el-GR" sz="3000" b="1" i="1" smtClean="0">
+                            <a:latin typeface="Cambria Math" charset="0"/>
+                            <a:ea typeface="Cambria Math" charset="0"/>
+                            <a:cs typeface="Cambria Math" charset="0"/>
+                          </a:rPr>
+                          <m:t>𝚪</m:t>
+                        </m:r>
+                        <m:r>
+                          <a:rPr lang="el-GR" sz="3000" b="1" i="1" smtClean="0">
+                            <a:latin typeface="Cambria Math" charset="0"/>
+                            <a:ea typeface="Cambria Math" charset="0"/>
+                            <a:cs typeface="Cambria Math" charset="0"/>
+                          </a:rPr>
+                          <m:t>𝝎</m:t>
+                        </m:r>
+                      </m:oMath>
+                    </a14:m>
+                    <a:r>
+                      <a:rPr lang="en-US" sz="3000" b="1" dirty="0" smtClean="0">
+                        <a:latin typeface="Yu Gothic" charset="-128"/>
+                        <a:ea typeface="Yu Gothic" charset="-128"/>
+                        <a:cs typeface="Yu Gothic" charset="-128"/>
+                      </a:rPr>
+                      <a:t> </a:t>
+                    </a:r>
+                    <a:r>
+                      <a:rPr lang="en-US" sz="3000" b="1" dirty="0" smtClean="0">
+                        <a:latin typeface="Yu Gothic" charset="-128"/>
+                        <a:ea typeface="Yu Gothic" charset="-128"/>
+                        <a:cs typeface="Yu Gothic" charset="-128"/>
+                      </a:rPr>
+                      <a:t>(H1+H3 </a:t>
+                    </a:r>
+                    <a:r>
+                      <a:rPr lang="en-US" sz="3000" b="1" dirty="0" err="1" smtClean="0">
+                        <a:latin typeface="Yu Gothic" charset="-128"/>
+                        <a:ea typeface="Yu Gothic" charset="-128"/>
+                        <a:cs typeface="Yu Gothic" charset="-128"/>
+                      </a:rPr>
+                      <a:t>avg</a:t>
+                    </a:r>
+                    <a:r>
+                      <a:rPr lang="en-US" sz="3000" b="1" dirty="0" smtClean="0">
+                        <a:latin typeface="Yu Gothic" charset="-128"/>
+                        <a:ea typeface="Yu Gothic" charset="-128"/>
+                        <a:cs typeface="Yu Gothic" charset="-128"/>
+                      </a:rPr>
+                      <a:t>) </a:t>
+                    </a:r>
+                    <a:r>
+                      <a:rPr lang="en-US" sz="3000" dirty="0" smtClean="0">
+                        <a:latin typeface="Yu Gothic" charset="-128"/>
+                        <a:ea typeface="Yu Gothic" charset="-128"/>
+                        <a:cs typeface="Yu Gothic" charset="-128"/>
+                      </a:rPr>
+                      <a:t>normalized branch length</a:t>
+                    </a:r>
+                    <a:endParaRPr lang="en-US" sz="3000" dirty="0">
+                      <a:latin typeface="Yu Gothic" charset="-128"/>
+                      <a:ea typeface="Yu Gothic" charset="-128"/>
+                      <a:cs typeface="Yu Gothic" charset="-128"/>
+                    </a:endParaRPr>
+                  </a:p>
+                </p:txBody>
+              </p:sp>
+            </mc:Choice>
+            <mc:Fallback>
+              <p:sp>
+                <p:nvSpPr>
+                  <p:cNvPr id="22" name="TextBox 21"/>
+                  <p:cNvSpPr txBox="1">
+                    <a:spLocks noRot="1" noChangeAspect="1" noMove="1" noResize="1" noEditPoints="1" noAdjustHandles="1" noChangeArrowheads="1" noChangeShapeType="1" noTextEdit="1"/>
+                  </p:cNvSpPr>
+                  <p:nvPr/>
+                </p:nvSpPr>
+                <p:spPr>
+                  <a:xfrm rot="16200000" flipH="1">
+                    <a:off x="-119094" y="2748597"/>
+                    <a:ext cx="4907286" cy="1015663"/>
+                  </a:xfrm>
+                  <a:prstGeom prst="rect">
+                    <a:avLst/>
+                  </a:prstGeom>
+                  <a:blipFill rotWithShape="0">
+                    <a:blip r:embed="rId3"/>
+                    <a:stretch>
+                      <a:fillRect l="-7831" t="-3727" r="-18072" b="-1739"/>
+                    </a:stretch>
+                  </a:blipFill>
+                </p:spPr>
+                <p:txBody>
+                  <a:bodyPr/>
+                  <a:lstStyle/>
+                  <a:p>
+                    <a:r>
+                      <a:rPr lang="en-US">
+                        <a:noFill/>
+                      </a:rPr>
+                      <a:t> </a:t>
+                    </a:r>
+                  </a:p>
+                </p:txBody>
+              </p:sp>
+            </mc:Fallback>
+          </mc:AlternateContent>
           <p:grpSp>
             <p:nvGrpSpPr>
               <p:cNvPr id="23" name="Group 22"/>

</xml_diff>